<commit_message>
Lot of changes... github sync failed
</commit_message>
<xml_diff>
--- a/Docs/DynThings.pptx
+++ b/Docs/DynThings.pptx
@@ -7,9 +7,13 @@
   <p:sldIdLst>
     <p:sldId id="256" r:id="rId2"/>
     <p:sldId id="257" r:id="rId3"/>
-    <p:sldId id="260" r:id="rId4"/>
-    <p:sldId id="261" r:id="rId5"/>
-    <p:sldId id="262" r:id="rId6"/>
+    <p:sldId id="263" r:id="rId4"/>
+    <p:sldId id="264" r:id="rId5"/>
+    <p:sldId id="265" r:id="rId6"/>
+    <p:sldId id="267" r:id="rId7"/>
+    <p:sldId id="260" r:id="rId8"/>
+    <p:sldId id="261" r:id="rId9"/>
+    <p:sldId id="262" r:id="rId10"/>
   </p:sldIdLst>
   <p:sldSz cx="12192000" cy="6858000"/>
   <p:notesSz cx="6858000" cy="9144000"/>
@@ -108,6 +112,11 @@
       </a:defRPr>
     </a:lvl9pPr>
   </p:defaultTextStyle>
+  <p:extLst>
+    <p:ext uri="{EFAFB233-063F-42B5-8137-9DF3F51BA10A}">
+      <p15:sldGuideLst xmlns:p15="http://schemas.microsoft.com/office/powerpoint/2012/main"/>
+    </p:ext>
+  </p:extLst>
 </p:presentation>
 </file>
 
@@ -156,7 +165,6 @@
               <a:rPr lang="en-US"/>
               <a:t>Click to edit Master title style</a:t>
             </a:r>
-            <a:endParaRPr lang="en-US"/>
           </a:p>
         </p:txBody>
       </p:sp>
@@ -221,7 +229,6 @@
               <a:rPr lang="en-US"/>
               <a:t>Click to edit Master subtitle style</a:t>
             </a:r>
-            <a:endParaRPr lang="en-US"/>
           </a:p>
         </p:txBody>
       </p:sp>
@@ -242,7 +249,7 @@
           <a:p>
             <a:fld id="{3B5835DB-7BDA-4312-9F31-898A3A52AD25}" type="datetimeFigureOut">
               <a:rPr lang="en-US" smtClean="0"/>
-              <a:t>10/18/2016</a:t>
+              <a:t>11/28/2016</a:t>
             </a:fld>
             <a:endParaRPr lang="en-US"/>
           </a:p>
@@ -339,7 +346,6 @@
               <a:rPr lang="en-US"/>
               <a:t>Click to edit Master title style</a:t>
             </a:r>
-            <a:endParaRPr lang="en-US"/>
           </a:p>
         </p:txBody>
       </p:sp>
@@ -391,7 +397,6 @@
               <a:rPr lang="en-US"/>
               <a:t>Fifth level</a:t>
             </a:r>
-            <a:endParaRPr lang="en-US"/>
           </a:p>
         </p:txBody>
       </p:sp>
@@ -412,7 +417,7 @@
           <a:p>
             <a:fld id="{3B5835DB-7BDA-4312-9F31-898A3A52AD25}" type="datetimeFigureOut">
               <a:rPr lang="en-US" smtClean="0"/>
-              <a:t>10/18/2016</a:t>
+              <a:t>11/28/2016</a:t>
             </a:fld>
             <a:endParaRPr lang="en-US"/>
           </a:p>
@@ -514,7 +519,6 @@
               <a:rPr lang="en-US"/>
               <a:t>Click to edit Master title style</a:t>
             </a:r>
-            <a:endParaRPr lang="en-US"/>
           </a:p>
         </p:txBody>
       </p:sp>
@@ -571,7 +575,6 @@
               <a:rPr lang="en-US"/>
               <a:t>Fifth level</a:t>
             </a:r>
-            <a:endParaRPr lang="en-US"/>
           </a:p>
         </p:txBody>
       </p:sp>
@@ -592,7 +595,7 @@
           <a:p>
             <a:fld id="{3B5835DB-7BDA-4312-9F31-898A3A52AD25}" type="datetimeFigureOut">
               <a:rPr lang="en-US" smtClean="0"/>
-              <a:t>10/18/2016</a:t>
+              <a:t>11/28/2016</a:t>
             </a:fld>
             <a:endParaRPr lang="en-US"/>
           </a:p>
@@ -689,7 +692,6 @@
               <a:rPr lang="en-US"/>
               <a:t>Click to edit Master title style</a:t>
             </a:r>
-            <a:endParaRPr lang="en-US"/>
           </a:p>
         </p:txBody>
       </p:sp>
@@ -741,7 +743,6 @@
               <a:rPr lang="en-US"/>
               <a:t>Fifth level</a:t>
             </a:r>
-            <a:endParaRPr lang="en-US"/>
           </a:p>
         </p:txBody>
       </p:sp>
@@ -762,7 +763,7 @@
           <a:p>
             <a:fld id="{3B5835DB-7BDA-4312-9F31-898A3A52AD25}" type="datetimeFigureOut">
               <a:rPr lang="en-US" smtClean="0"/>
-              <a:t>10/18/2016</a:t>
+              <a:t>11/28/2016</a:t>
             </a:fld>
             <a:endParaRPr lang="en-US"/>
           </a:p>
@@ -868,7 +869,6 @@
               <a:rPr lang="en-US"/>
               <a:t>Click to edit Master title style</a:t>
             </a:r>
-            <a:endParaRPr lang="en-US"/>
           </a:p>
         </p:txBody>
       </p:sp>
@@ -1008,7 +1008,7 @@
           <a:p>
             <a:fld id="{3B5835DB-7BDA-4312-9F31-898A3A52AD25}" type="datetimeFigureOut">
               <a:rPr lang="en-US" smtClean="0"/>
-              <a:t>10/18/2016</a:t>
+              <a:t>11/28/2016</a:t>
             </a:fld>
             <a:endParaRPr lang="en-US"/>
           </a:p>
@@ -1105,7 +1105,6 @@
               <a:rPr lang="en-US"/>
               <a:t>Click to edit Master title style</a:t>
             </a:r>
-            <a:endParaRPr lang="en-US"/>
           </a:p>
         </p:txBody>
       </p:sp>
@@ -1162,7 +1161,6 @@
               <a:rPr lang="en-US"/>
               <a:t>Fifth level</a:t>
             </a:r>
-            <a:endParaRPr lang="en-US"/>
           </a:p>
         </p:txBody>
       </p:sp>
@@ -1219,7 +1217,6 @@
               <a:rPr lang="en-US"/>
               <a:t>Fifth level</a:t>
             </a:r>
-            <a:endParaRPr lang="en-US"/>
           </a:p>
         </p:txBody>
       </p:sp>
@@ -1240,7 +1237,7 @@
           <a:p>
             <a:fld id="{3B5835DB-7BDA-4312-9F31-898A3A52AD25}" type="datetimeFigureOut">
               <a:rPr lang="en-US" smtClean="0"/>
-              <a:t>10/18/2016</a:t>
+              <a:t>11/28/2016</a:t>
             </a:fld>
             <a:endParaRPr lang="en-US"/>
           </a:p>
@@ -1342,7 +1339,6 @@
               <a:rPr lang="en-US"/>
               <a:t>Click to edit Master title style</a:t>
             </a:r>
-            <a:endParaRPr lang="en-US"/>
           </a:p>
         </p:txBody>
       </p:sp>
@@ -1464,7 +1460,6 @@
               <a:rPr lang="en-US"/>
               <a:t>Fifth level</a:t>
             </a:r>
-            <a:endParaRPr lang="en-US"/>
           </a:p>
         </p:txBody>
       </p:sp>
@@ -1586,7 +1581,6 @@
               <a:rPr lang="en-US"/>
               <a:t>Fifth level</a:t>
             </a:r>
-            <a:endParaRPr lang="en-US"/>
           </a:p>
         </p:txBody>
       </p:sp>
@@ -1607,7 +1601,7 @@
           <a:p>
             <a:fld id="{3B5835DB-7BDA-4312-9F31-898A3A52AD25}" type="datetimeFigureOut">
               <a:rPr lang="en-US" smtClean="0"/>
-              <a:t>10/18/2016</a:t>
+              <a:t>11/28/2016</a:t>
             </a:fld>
             <a:endParaRPr lang="en-US"/>
           </a:p>
@@ -1704,7 +1698,6 @@
               <a:rPr lang="en-US"/>
               <a:t>Click to edit Master title style</a:t>
             </a:r>
-            <a:endParaRPr lang="en-US"/>
           </a:p>
         </p:txBody>
       </p:sp>
@@ -1725,7 +1718,7 @@
           <a:p>
             <a:fld id="{3B5835DB-7BDA-4312-9F31-898A3A52AD25}" type="datetimeFigureOut">
               <a:rPr lang="en-US" smtClean="0"/>
-              <a:t>10/18/2016</a:t>
+              <a:t>11/28/2016</a:t>
             </a:fld>
             <a:endParaRPr lang="en-US"/>
           </a:p>
@@ -1820,7 +1813,7 @@
           <a:p>
             <a:fld id="{3B5835DB-7BDA-4312-9F31-898A3A52AD25}" type="datetimeFigureOut">
               <a:rPr lang="en-US" smtClean="0"/>
-              <a:t>10/18/2016</a:t>
+              <a:t>11/28/2016</a:t>
             </a:fld>
             <a:endParaRPr lang="en-US"/>
           </a:p>
@@ -1926,7 +1919,6 @@
               <a:rPr lang="en-US"/>
               <a:t>Click to edit Master title style</a:t>
             </a:r>
-            <a:endParaRPr lang="en-US"/>
           </a:p>
         </p:txBody>
       </p:sp>
@@ -2011,7 +2003,6 @@
               <a:rPr lang="en-US"/>
               <a:t>Fifth level</a:t>
             </a:r>
-            <a:endParaRPr lang="en-US"/>
           </a:p>
         </p:txBody>
       </p:sp>
@@ -2097,7 +2088,7 @@
           <a:p>
             <a:fld id="{3B5835DB-7BDA-4312-9F31-898A3A52AD25}" type="datetimeFigureOut">
               <a:rPr lang="en-US" smtClean="0"/>
-              <a:t>10/18/2016</a:t>
+              <a:t>11/28/2016</a:t>
             </a:fld>
             <a:endParaRPr lang="en-US"/>
           </a:p>
@@ -2203,7 +2194,6 @@
               <a:rPr lang="en-US"/>
               <a:t>Click to edit Master title style</a:t>
             </a:r>
-            <a:endParaRPr lang="en-US"/>
           </a:p>
         </p:txBody>
       </p:sp>
@@ -2350,7 +2340,7 @@
           <a:p>
             <a:fld id="{3B5835DB-7BDA-4312-9F31-898A3A52AD25}" type="datetimeFigureOut">
               <a:rPr lang="en-US" smtClean="0"/>
-              <a:t>10/18/2016</a:t>
+              <a:t>11/28/2016</a:t>
             </a:fld>
             <a:endParaRPr lang="en-US"/>
           </a:p>
@@ -2462,7 +2452,6 @@
               <a:rPr lang="en-US"/>
               <a:t>Click to edit Master title style</a:t>
             </a:r>
-            <a:endParaRPr lang="en-US"/>
           </a:p>
         </p:txBody>
       </p:sp>
@@ -2524,7 +2513,6 @@
               <a:rPr lang="en-US"/>
               <a:t>Fifth level</a:t>
             </a:r>
-            <a:endParaRPr lang="en-US"/>
           </a:p>
         </p:txBody>
       </p:sp>
@@ -2563,7 +2551,7 @@
           <a:p>
             <a:fld id="{3B5835DB-7BDA-4312-9F31-898A3A52AD25}" type="datetimeFigureOut">
               <a:rPr lang="en-US" smtClean="0"/>
-              <a:t>10/18/2016</a:t>
+              <a:t>11/28/2016</a:t>
             </a:fld>
             <a:endParaRPr lang="en-US"/>
           </a:p>
@@ -3935,6 +3923,1554 @@
 </file>
 
 <file path=ppt/slides/slide3.xml><?xml version="1.0" encoding="utf-8"?>
+<p:sld xmlns:a="http://schemas.openxmlformats.org/drawingml/2006/main" xmlns:r="http://schemas.openxmlformats.org/officeDocument/2006/relationships" xmlns:p="http://schemas.openxmlformats.org/presentationml/2006/main">
+  <p:cSld>
+    <p:bg>
+      <p:bgPr>
+        <a:solidFill>
+          <a:srgbClr val="0078D7"/>
+        </a:solidFill>
+        <a:effectLst/>
+      </p:bgPr>
+    </p:bg>
+    <p:spTree>
+      <p:nvGrpSpPr>
+        <p:cNvPr id="1" name=""/>
+        <p:cNvGrpSpPr/>
+        <p:nvPr/>
+      </p:nvGrpSpPr>
+      <p:grpSpPr>
+        <a:xfrm>
+          <a:off x="0" y="0"/>
+          <a:ext cx="0" cy="0"/>
+          <a:chOff x="0" y="0"/>
+          <a:chExt cx="0" cy="0"/>
+        </a:xfrm>
+      </p:grpSpPr>
+      <p:sp>
+        <p:nvSpPr>
+          <p:cNvPr id="64" name="Rectangle 63"/>
+          <p:cNvSpPr/>
+          <p:nvPr/>
+        </p:nvSpPr>
+        <p:spPr>
+          <a:xfrm>
+            <a:off x="0" y="1972"/>
+            <a:ext cx="12192000" cy="1007235"/>
+          </a:xfrm>
+          <a:prstGeom prst="rect">
+            <a:avLst/>
+          </a:prstGeom>
+          <a:solidFill>
+            <a:srgbClr val="002050"/>
+          </a:solidFill>
+          <a:ln>
+            <a:noFill/>
+          </a:ln>
+        </p:spPr>
+        <p:style>
+          <a:lnRef idx="2">
+            <a:schemeClr val="accent1">
+              <a:shade val="50000"/>
+            </a:schemeClr>
+          </a:lnRef>
+          <a:fillRef idx="1">
+            <a:schemeClr val="accent1"/>
+          </a:fillRef>
+          <a:effectRef idx="0">
+            <a:schemeClr val="accent1"/>
+          </a:effectRef>
+          <a:fontRef idx="minor">
+            <a:schemeClr val="lt1"/>
+          </a:fontRef>
+        </p:style>
+        <p:txBody>
+          <a:bodyPr rtlCol="0" anchor="ctr"/>
+          <a:lstStyle/>
+          <a:p>
+            <a:pPr algn="ctr"/>
+            <a:endParaRPr lang="en-US" dirty="0"/>
+          </a:p>
+        </p:txBody>
+      </p:sp>
+      <p:sp>
+        <p:nvSpPr>
+          <p:cNvPr id="65" name="Rectangle 64"/>
+          <p:cNvSpPr/>
+          <p:nvPr/>
+        </p:nvSpPr>
+        <p:spPr>
+          <a:xfrm>
+            <a:off x="181095" y="60755"/>
+            <a:ext cx="7722242" cy="820096"/>
+          </a:xfrm>
+          <a:prstGeom prst="rect">
+            <a:avLst/>
+          </a:prstGeom>
+        </p:spPr>
+        <p:txBody>
+          <a:bodyPr wrap="none">
+            <a:spAutoFit/>
+          </a:bodyPr>
+          <a:lstStyle/>
+          <a:p>
+            <a:pPr>
+              <a:lnSpc>
+                <a:spcPct val="150000"/>
+              </a:lnSpc>
+            </a:pPr>
+            <a:r>
+              <a:rPr lang="en-US" sz="3600" dirty="0">
+                <a:solidFill>
+                  <a:schemeClr val="bg1"/>
+                </a:solidFill>
+                <a:latin typeface="Segoe UI Light" panose="020B0502040204020203" pitchFamily="34" charset="0"/>
+                <a:cs typeface="Segoe UI Light" panose="020B0502040204020203" pitchFamily="34" charset="0"/>
+              </a:rPr>
+              <a:t>Why should I use </a:t>
+            </a:r>
+            <a:r>
+              <a:rPr lang="en-US" sz="3600" dirty="0" err="1">
+                <a:solidFill>
+                  <a:schemeClr val="bg1"/>
+                </a:solidFill>
+                <a:latin typeface="Segoe UI Light" panose="020B0502040204020203" pitchFamily="34" charset="0"/>
+                <a:cs typeface="Segoe UI Light" panose="020B0502040204020203" pitchFamily="34" charset="0"/>
+              </a:rPr>
+              <a:t>DynThings</a:t>
+            </a:r>
+            <a:r>
+              <a:rPr lang="en-US" sz="3600" dirty="0">
+                <a:solidFill>
+                  <a:schemeClr val="bg1"/>
+                </a:solidFill>
+                <a:latin typeface="Segoe UI Light" panose="020B0502040204020203" pitchFamily="34" charset="0"/>
+                <a:cs typeface="Segoe UI Light" panose="020B0502040204020203" pitchFamily="34" charset="0"/>
+              </a:rPr>
+              <a:t> Platform ?</a:t>
+            </a:r>
+          </a:p>
+        </p:txBody>
+      </p:sp>
+      <p:sp>
+        <p:nvSpPr>
+          <p:cNvPr id="69" name="Title 1"/>
+          <p:cNvSpPr txBox="1">
+            <a:spLocks/>
+          </p:cNvSpPr>
+          <p:nvPr/>
+        </p:nvSpPr>
+        <p:spPr>
+          <a:xfrm>
+            <a:off x="911677" y="1470787"/>
+            <a:ext cx="10956861" cy="4052935"/>
+          </a:xfrm>
+          <a:prstGeom prst="rect">
+            <a:avLst/>
+          </a:prstGeom>
+        </p:spPr>
+        <p:txBody>
+          <a:bodyPr vert="horz" lIns="91440" tIns="45720" rIns="91440" bIns="45720" rtlCol="0" anchor="t">
+            <a:noAutofit/>
+          </a:bodyPr>
+          <a:lstStyle>
+            <a:lvl1pPr algn="ctr" defTabSz="914400" rtl="0" eaLnBrk="1" latinLnBrk="0" hangingPunct="1">
+              <a:lnSpc>
+                <a:spcPct val="90000"/>
+              </a:lnSpc>
+              <a:spcBef>
+                <a:spcPct val="0"/>
+              </a:spcBef>
+              <a:buNone/>
+              <a:defRPr sz="6000" kern="1200">
+                <a:solidFill>
+                  <a:schemeClr val="tx1"/>
+                </a:solidFill>
+                <a:latin typeface="+mj-lt"/>
+                <a:ea typeface="+mj-ea"/>
+                <a:cs typeface="+mj-cs"/>
+              </a:defRPr>
+            </a:lvl1pPr>
+          </a:lstStyle>
+          <a:p>
+            <a:pPr marL="457200" indent="-457200" algn="l">
+              <a:lnSpc>
+                <a:spcPct val="150000"/>
+              </a:lnSpc>
+              <a:buFont typeface="Wingdings" panose="05000000000000000000" pitchFamily="2" charset="2"/>
+              <a:buChar char="§"/>
+            </a:pPr>
+            <a:r>
+              <a:rPr lang="en-US" sz="2800" dirty="0">
+                <a:solidFill>
+                  <a:schemeClr val="bg1"/>
+                </a:solidFill>
+                <a:latin typeface="Segoe UI Light" panose="020B0502040204020203" pitchFamily="34" charset="0"/>
+                <a:cs typeface="Segoe UI Light" panose="020B0502040204020203" pitchFamily="34" charset="0"/>
+              </a:rPr>
+              <a:t>Designed for Developers &amp; End Users.</a:t>
+            </a:r>
+          </a:p>
+          <a:p>
+            <a:pPr marL="457200" indent="-457200" algn="l">
+              <a:lnSpc>
+                <a:spcPct val="150000"/>
+              </a:lnSpc>
+              <a:buFont typeface="Wingdings" panose="05000000000000000000" pitchFamily="2" charset="2"/>
+              <a:buChar char="§"/>
+            </a:pPr>
+            <a:r>
+              <a:rPr lang="en-US" sz="2800" dirty="0">
+                <a:solidFill>
+                  <a:schemeClr val="bg1"/>
+                </a:solidFill>
+                <a:latin typeface="Segoe UI Light" panose="020B0502040204020203" pitchFamily="34" charset="0"/>
+                <a:cs typeface="Segoe UI Light" panose="020B0502040204020203" pitchFamily="34" charset="0"/>
+              </a:rPr>
+              <a:t>Developers can “Tweak the code”, “Customize” or ……</a:t>
+            </a:r>
+          </a:p>
+          <a:p>
+            <a:pPr marL="457200" indent="-457200" algn="l">
+              <a:lnSpc>
+                <a:spcPct val="150000"/>
+              </a:lnSpc>
+              <a:buFont typeface="Wingdings" panose="05000000000000000000" pitchFamily="2" charset="2"/>
+              <a:buChar char="§"/>
+            </a:pPr>
+            <a:r>
+              <a:rPr lang="en-US" sz="2800" dirty="0">
+                <a:solidFill>
+                  <a:schemeClr val="bg1"/>
+                </a:solidFill>
+                <a:latin typeface="Segoe UI Light" panose="020B0502040204020203" pitchFamily="34" charset="0"/>
+                <a:cs typeface="Segoe UI Light" panose="020B0502040204020203" pitchFamily="34" charset="0"/>
+              </a:rPr>
+              <a:t>Easy to manage.</a:t>
+            </a:r>
+          </a:p>
+          <a:p>
+            <a:pPr marL="457200" indent="-457200" algn="l">
+              <a:lnSpc>
+                <a:spcPct val="150000"/>
+              </a:lnSpc>
+              <a:buFont typeface="Wingdings" panose="05000000000000000000" pitchFamily="2" charset="2"/>
+              <a:buChar char="§"/>
+            </a:pPr>
+            <a:r>
+              <a:rPr lang="en-US" sz="2800" dirty="0">
+                <a:solidFill>
+                  <a:schemeClr val="bg1"/>
+                </a:solidFill>
+                <a:latin typeface="Segoe UI Light" panose="020B0502040204020203" pitchFamily="34" charset="0"/>
+                <a:cs typeface="Segoe UI Light" panose="020B0502040204020203" pitchFamily="34" charset="0"/>
+              </a:rPr>
+              <a:t>Re-assign endpoints to different Things.</a:t>
+            </a:r>
+          </a:p>
+          <a:p>
+            <a:pPr marL="457200" indent="-457200" algn="l">
+              <a:lnSpc>
+                <a:spcPct val="150000"/>
+              </a:lnSpc>
+              <a:buFont typeface="Wingdings" panose="05000000000000000000" pitchFamily="2" charset="2"/>
+              <a:buChar char="§"/>
+            </a:pPr>
+            <a:r>
+              <a:rPr lang="en-US" sz="2800" dirty="0">
+                <a:solidFill>
+                  <a:schemeClr val="bg1"/>
+                </a:solidFill>
+                <a:latin typeface="Segoe UI Light" panose="020B0502040204020203" pitchFamily="34" charset="0"/>
+                <a:cs typeface="Segoe UI Light" panose="020B0502040204020203" pitchFamily="34" charset="0"/>
+              </a:rPr>
+              <a:t>Free, no hidden cost.</a:t>
+            </a:r>
+          </a:p>
+          <a:p>
+            <a:pPr marL="457200" indent="-457200" algn="l">
+              <a:lnSpc>
+                <a:spcPct val="150000"/>
+              </a:lnSpc>
+              <a:buFont typeface="Wingdings" panose="05000000000000000000" pitchFamily="2" charset="2"/>
+              <a:buChar char="§"/>
+            </a:pPr>
+            <a:r>
+              <a:rPr lang="en-US" sz="2800" dirty="0">
+                <a:solidFill>
+                  <a:schemeClr val="bg1"/>
+                </a:solidFill>
+                <a:latin typeface="Segoe UI Light" panose="020B0502040204020203" pitchFamily="34" charset="0"/>
+                <a:cs typeface="Segoe UI Light" panose="020B0502040204020203" pitchFamily="34" charset="0"/>
+              </a:rPr>
+              <a:t>UI &amp; UX based on top of Mid-layer architecture.</a:t>
+            </a:r>
+          </a:p>
+          <a:p>
+            <a:pPr marL="457200" indent="-457200" algn="l">
+              <a:lnSpc>
+                <a:spcPct val="150000"/>
+              </a:lnSpc>
+              <a:buFont typeface="Wingdings" panose="05000000000000000000" pitchFamily="2" charset="2"/>
+              <a:buChar char="§"/>
+            </a:pPr>
+            <a:endParaRPr lang="en-US" sz="2800" dirty="0">
+              <a:solidFill>
+                <a:schemeClr val="bg1"/>
+              </a:solidFill>
+              <a:latin typeface="Segoe UI Light" panose="020B0502040204020203" pitchFamily="34" charset="0"/>
+              <a:cs typeface="Segoe UI Light" panose="020B0502040204020203" pitchFamily="34" charset="0"/>
+            </a:endParaRPr>
+          </a:p>
+          <a:p>
+            <a:pPr marL="457200" indent="-457200" algn="l">
+              <a:lnSpc>
+                <a:spcPct val="150000"/>
+              </a:lnSpc>
+              <a:buFont typeface="Wingdings" panose="05000000000000000000" pitchFamily="2" charset="2"/>
+              <a:buChar char="§"/>
+            </a:pPr>
+            <a:endParaRPr lang="en-US" sz="2800" dirty="0">
+              <a:solidFill>
+                <a:schemeClr val="bg1"/>
+              </a:solidFill>
+              <a:latin typeface="Segoe UI Light" panose="020B0502040204020203" pitchFamily="34" charset="0"/>
+              <a:cs typeface="Segoe UI Light" panose="020B0502040204020203" pitchFamily="34" charset="0"/>
+            </a:endParaRPr>
+          </a:p>
+          <a:p>
+            <a:pPr marL="457200" indent="-457200" algn="l">
+              <a:lnSpc>
+                <a:spcPct val="150000"/>
+              </a:lnSpc>
+              <a:buFont typeface="Wingdings" panose="05000000000000000000" pitchFamily="2" charset="2"/>
+              <a:buChar char="§"/>
+            </a:pPr>
+            <a:endParaRPr lang="en-US" sz="2800" dirty="0">
+              <a:solidFill>
+                <a:schemeClr val="bg1"/>
+              </a:solidFill>
+              <a:latin typeface="Segoe UI Light" panose="020B0502040204020203" pitchFamily="34" charset="0"/>
+              <a:cs typeface="Segoe UI Light" panose="020B0502040204020203" pitchFamily="34" charset="0"/>
+            </a:endParaRPr>
+          </a:p>
+        </p:txBody>
+      </p:sp>
+      <p:sp>
+        <p:nvSpPr>
+          <p:cNvPr id="70" name="Rectangle 69"/>
+          <p:cNvSpPr/>
+          <p:nvPr/>
+        </p:nvSpPr>
+        <p:spPr>
+          <a:xfrm>
+            <a:off x="0" y="6570725"/>
+            <a:ext cx="12192000" cy="287276"/>
+          </a:xfrm>
+          <a:prstGeom prst="rect">
+            <a:avLst/>
+          </a:prstGeom>
+          <a:solidFill>
+            <a:srgbClr val="002050"/>
+          </a:solidFill>
+          <a:ln>
+            <a:noFill/>
+          </a:ln>
+        </p:spPr>
+        <p:style>
+          <a:lnRef idx="2">
+            <a:schemeClr val="accent1">
+              <a:shade val="50000"/>
+            </a:schemeClr>
+          </a:lnRef>
+          <a:fillRef idx="1">
+            <a:schemeClr val="accent1"/>
+          </a:fillRef>
+          <a:effectRef idx="0">
+            <a:schemeClr val="accent1"/>
+          </a:effectRef>
+          <a:fontRef idx="minor">
+            <a:schemeClr val="lt1"/>
+          </a:fontRef>
+        </p:style>
+        <p:txBody>
+          <a:bodyPr rtlCol="0" anchor="ctr"/>
+          <a:lstStyle/>
+          <a:p>
+            <a:pPr algn="ctr"/>
+            <a:endParaRPr lang="en-US" dirty="0"/>
+          </a:p>
+        </p:txBody>
+      </p:sp>
+    </p:spTree>
+    <p:extLst>
+      <p:ext uri="{BB962C8B-B14F-4D97-AF65-F5344CB8AC3E}">
+        <p14:creationId xmlns:p14="http://schemas.microsoft.com/office/powerpoint/2010/main" val="1038759866"/>
+      </p:ext>
+    </p:extLst>
+  </p:cSld>
+  <p:clrMapOvr>
+    <a:masterClrMapping/>
+  </p:clrMapOvr>
+  <p:transition spd="slow">
+    <p:push dir="u"/>
+  </p:transition>
+  <p:timing>
+    <p:tnLst>
+      <p:par>
+        <p:cTn id="1" dur="indefinite" restart="never" nodeType="tmRoot">
+          <p:childTnLst>
+            <p:seq concurrent="1" nextAc="seek">
+              <p:cTn id="2" dur="indefinite" nodeType="mainSeq">
+                <p:childTnLst>
+                  <p:par>
+                    <p:cTn id="3" fill="hold">
+                      <p:stCondLst>
+                        <p:cond delay="indefinite"/>
+                        <p:cond evt="onBegin" delay="0">
+                          <p:tn val="2"/>
+                        </p:cond>
+                      </p:stCondLst>
+                      <p:childTnLst>
+                        <p:par>
+                          <p:cTn id="4" fill="hold">
+                            <p:stCondLst>
+                              <p:cond delay="0"/>
+                            </p:stCondLst>
+                            <p:childTnLst>
+                              <p:par>
+                                <p:cTn id="5" presetID="10" presetClass="entr" presetSubtype="0" fill="hold" grpId="0" nodeType="afterEffect">
+                                  <p:stCondLst>
+                                    <p:cond delay="0"/>
+                                  </p:stCondLst>
+                                  <p:childTnLst>
+                                    <p:set>
+                                      <p:cBhvr>
+                                        <p:cTn id="6" dur="1" fill="hold">
+                                          <p:stCondLst>
+                                            <p:cond delay="0"/>
+                                          </p:stCondLst>
+                                        </p:cTn>
+                                        <p:tgtEl>
+                                          <p:spTgt spid="69"/>
+                                        </p:tgtEl>
+                                        <p:attrNameLst>
+                                          <p:attrName>style.visibility</p:attrName>
+                                        </p:attrNameLst>
+                                      </p:cBhvr>
+                                      <p:to>
+                                        <p:strVal val="visible"/>
+                                      </p:to>
+                                    </p:set>
+                                    <p:animEffect transition="in" filter="fade">
+                                      <p:cBhvr>
+                                        <p:cTn id="7" dur="500"/>
+                                        <p:tgtEl>
+                                          <p:spTgt spid="69"/>
+                                        </p:tgtEl>
+                                      </p:cBhvr>
+                                    </p:animEffect>
+                                  </p:childTnLst>
+                                </p:cTn>
+                              </p:par>
+                            </p:childTnLst>
+                          </p:cTn>
+                        </p:par>
+                      </p:childTnLst>
+                    </p:cTn>
+                  </p:par>
+                </p:childTnLst>
+              </p:cTn>
+              <p:prevCondLst>
+                <p:cond evt="onPrev" delay="0">
+                  <p:tgtEl>
+                    <p:sldTgt/>
+                  </p:tgtEl>
+                </p:cond>
+              </p:prevCondLst>
+              <p:nextCondLst>
+                <p:cond evt="onNext" delay="0">
+                  <p:tgtEl>
+                    <p:sldTgt/>
+                  </p:tgtEl>
+                </p:cond>
+              </p:nextCondLst>
+            </p:seq>
+          </p:childTnLst>
+        </p:cTn>
+      </p:par>
+    </p:tnLst>
+    <p:bldLst>
+      <p:bldP spid="69" grpId="0"/>
+    </p:bldLst>
+  </p:timing>
+</p:sld>
+</file>
+
+<file path=ppt/slides/slide4.xml><?xml version="1.0" encoding="utf-8"?>
+<p:sld xmlns:a="http://schemas.openxmlformats.org/drawingml/2006/main" xmlns:r="http://schemas.openxmlformats.org/officeDocument/2006/relationships" xmlns:p="http://schemas.openxmlformats.org/presentationml/2006/main">
+  <p:cSld>
+    <p:bg>
+      <p:bgPr>
+        <a:solidFill>
+          <a:srgbClr val="0078D7"/>
+        </a:solidFill>
+        <a:effectLst/>
+      </p:bgPr>
+    </p:bg>
+    <p:spTree>
+      <p:nvGrpSpPr>
+        <p:cNvPr id="1" name=""/>
+        <p:cNvGrpSpPr/>
+        <p:nvPr/>
+      </p:nvGrpSpPr>
+      <p:grpSpPr>
+        <a:xfrm>
+          <a:off x="0" y="0"/>
+          <a:ext cx="0" cy="0"/>
+          <a:chOff x="0" y="0"/>
+          <a:chExt cx="0" cy="0"/>
+        </a:xfrm>
+      </p:grpSpPr>
+      <p:sp>
+        <p:nvSpPr>
+          <p:cNvPr id="64" name="Rectangle 63"/>
+          <p:cNvSpPr/>
+          <p:nvPr/>
+        </p:nvSpPr>
+        <p:spPr>
+          <a:xfrm>
+            <a:off x="0" y="1972"/>
+            <a:ext cx="12192000" cy="1007235"/>
+          </a:xfrm>
+          <a:prstGeom prst="rect">
+            <a:avLst/>
+          </a:prstGeom>
+          <a:solidFill>
+            <a:srgbClr val="002050"/>
+          </a:solidFill>
+          <a:ln>
+            <a:noFill/>
+          </a:ln>
+        </p:spPr>
+        <p:style>
+          <a:lnRef idx="2">
+            <a:schemeClr val="accent1">
+              <a:shade val="50000"/>
+            </a:schemeClr>
+          </a:lnRef>
+          <a:fillRef idx="1">
+            <a:schemeClr val="accent1"/>
+          </a:fillRef>
+          <a:effectRef idx="0">
+            <a:schemeClr val="accent1"/>
+          </a:effectRef>
+          <a:fontRef idx="minor">
+            <a:schemeClr val="lt1"/>
+          </a:fontRef>
+        </p:style>
+        <p:txBody>
+          <a:bodyPr rtlCol="0" anchor="ctr"/>
+          <a:lstStyle/>
+          <a:p>
+            <a:pPr algn="ctr"/>
+            <a:endParaRPr lang="en-US" dirty="0"/>
+          </a:p>
+        </p:txBody>
+      </p:sp>
+      <p:sp>
+        <p:nvSpPr>
+          <p:cNvPr id="65" name="Rectangle 64"/>
+          <p:cNvSpPr/>
+          <p:nvPr/>
+        </p:nvSpPr>
+        <p:spPr>
+          <a:xfrm>
+            <a:off x="181095" y="60755"/>
+            <a:ext cx="6335773" cy="820096"/>
+          </a:xfrm>
+          <a:prstGeom prst="rect">
+            <a:avLst/>
+          </a:prstGeom>
+        </p:spPr>
+        <p:txBody>
+          <a:bodyPr wrap="none">
+            <a:spAutoFit/>
+          </a:bodyPr>
+          <a:lstStyle/>
+          <a:p>
+            <a:pPr>
+              <a:lnSpc>
+                <a:spcPct val="150000"/>
+              </a:lnSpc>
+            </a:pPr>
+            <a:r>
+              <a:rPr lang="en-US" sz="3600" dirty="0">
+                <a:solidFill>
+                  <a:schemeClr val="bg1"/>
+                </a:solidFill>
+                <a:latin typeface="Segoe UI Light" panose="020B0502040204020203" pitchFamily="34" charset="0"/>
+                <a:cs typeface="Segoe UI Light" panose="020B0502040204020203" pitchFamily="34" charset="0"/>
+              </a:rPr>
+              <a:t>Who is targeted by </a:t>
+            </a:r>
+            <a:r>
+              <a:rPr lang="en-US" sz="3600" dirty="0" err="1">
+                <a:solidFill>
+                  <a:schemeClr val="bg1"/>
+                </a:solidFill>
+                <a:latin typeface="Segoe UI Light" panose="020B0502040204020203" pitchFamily="34" charset="0"/>
+                <a:cs typeface="Segoe UI Light" panose="020B0502040204020203" pitchFamily="34" charset="0"/>
+              </a:rPr>
+              <a:t>DynThings</a:t>
+            </a:r>
+            <a:r>
+              <a:rPr lang="en-US" sz="3600" dirty="0">
+                <a:solidFill>
+                  <a:schemeClr val="bg1"/>
+                </a:solidFill>
+                <a:latin typeface="Segoe UI Light" panose="020B0502040204020203" pitchFamily="34" charset="0"/>
+                <a:cs typeface="Segoe UI Light" panose="020B0502040204020203" pitchFamily="34" charset="0"/>
+              </a:rPr>
+              <a:t> ?</a:t>
+            </a:r>
+          </a:p>
+        </p:txBody>
+      </p:sp>
+      <p:sp>
+        <p:nvSpPr>
+          <p:cNvPr id="69" name="Title 1"/>
+          <p:cNvSpPr txBox="1">
+            <a:spLocks/>
+          </p:cNvSpPr>
+          <p:nvPr/>
+        </p:nvSpPr>
+        <p:spPr>
+          <a:xfrm>
+            <a:off x="911677" y="1470787"/>
+            <a:ext cx="10956861" cy="4052935"/>
+          </a:xfrm>
+          <a:prstGeom prst="rect">
+            <a:avLst/>
+          </a:prstGeom>
+        </p:spPr>
+        <p:txBody>
+          <a:bodyPr vert="horz" lIns="91440" tIns="45720" rIns="91440" bIns="45720" rtlCol="0" anchor="t">
+            <a:noAutofit/>
+          </a:bodyPr>
+          <a:lstStyle>
+            <a:lvl1pPr algn="ctr" defTabSz="914400" rtl="0" eaLnBrk="1" latinLnBrk="0" hangingPunct="1">
+              <a:lnSpc>
+                <a:spcPct val="90000"/>
+              </a:lnSpc>
+              <a:spcBef>
+                <a:spcPct val="0"/>
+              </a:spcBef>
+              <a:buNone/>
+              <a:defRPr sz="6000" kern="1200">
+                <a:solidFill>
+                  <a:schemeClr val="tx1"/>
+                </a:solidFill>
+                <a:latin typeface="+mj-lt"/>
+                <a:ea typeface="+mj-ea"/>
+                <a:cs typeface="+mj-cs"/>
+              </a:defRPr>
+            </a:lvl1pPr>
+          </a:lstStyle>
+          <a:p>
+            <a:pPr marL="457200" indent="-457200" algn="l">
+              <a:lnSpc>
+                <a:spcPct val="150000"/>
+              </a:lnSpc>
+              <a:buFont typeface="Wingdings" panose="05000000000000000000" pitchFamily="2" charset="2"/>
+              <a:buChar char="§"/>
+            </a:pPr>
+            <a:r>
+              <a:rPr lang="en-US" sz="2800" dirty="0">
+                <a:solidFill>
+                  <a:schemeClr val="bg1"/>
+                </a:solidFill>
+                <a:latin typeface="Segoe UI Light" panose="020B0502040204020203" pitchFamily="34" charset="0"/>
+                <a:cs typeface="Segoe UI Light" panose="020B0502040204020203" pitchFamily="34" charset="0"/>
+              </a:rPr>
+              <a:t>Organizations with Limited budget.</a:t>
+            </a:r>
+          </a:p>
+          <a:p>
+            <a:pPr marL="457200" indent="-457200" algn="l">
+              <a:lnSpc>
+                <a:spcPct val="150000"/>
+              </a:lnSpc>
+              <a:buFont typeface="Wingdings" panose="05000000000000000000" pitchFamily="2" charset="2"/>
+              <a:buChar char="§"/>
+            </a:pPr>
+            <a:r>
+              <a:rPr lang="en-US" sz="2800" dirty="0">
+                <a:solidFill>
+                  <a:schemeClr val="bg1"/>
+                </a:solidFill>
+                <a:latin typeface="Segoe UI Light" panose="020B0502040204020203" pitchFamily="34" charset="0"/>
+                <a:cs typeface="Segoe UI Light" panose="020B0502040204020203" pitchFamily="34" charset="0"/>
+              </a:rPr>
+              <a:t>Organizations who want to OWN the platform.</a:t>
+            </a:r>
+          </a:p>
+          <a:p>
+            <a:pPr marL="457200" indent="-457200" algn="l">
+              <a:lnSpc>
+                <a:spcPct val="150000"/>
+              </a:lnSpc>
+              <a:buFont typeface="Wingdings" panose="05000000000000000000" pitchFamily="2" charset="2"/>
+              <a:buChar char="§"/>
+            </a:pPr>
+            <a:r>
+              <a:rPr lang="en-US" sz="2800" dirty="0" err="1">
+                <a:solidFill>
+                  <a:schemeClr val="bg1"/>
+                </a:solidFill>
+                <a:latin typeface="Segoe UI Light" panose="020B0502040204020203" pitchFamily="34" charset="0"/>
+                <a:cs typeface="Segoe UI Light" panose="020B0502040204020203" pitchFamily="34" charset="0"/>
+              </a:rPr>
+              <a:t>IoT</a:t>
+            </a:r>
+            <a:r>
+              <a:rPr lang="en-US" sz="2800" dirty="0">
+                <a:solidFill>
+                  <a:schemeClr val="bg1"/>
+                </a:solidFill>
+                <a:latin typeface="Segoe UI Light" panose="020B0502040204020203" pitchFamily="34" charset="0"/>
+                <a:cs typeface="Segoe UI Light" panose="020B0502040204020203" pitchFamily="34" charset="0"/>
+              </a:rPr>
+              <a:t> data gathering projects.</a:t>
+            </a:r>
+          </a:p>
+          <a:p>
+            <a:pPr marL="457200" indent="-457200" algn="l">
+              <a:lnSpc>
+                <a:spcPct val="150000"/>
+              </a:lnSpc>
+              <a:buFont typeface="Wingdings" panose="05000000000000000000" pitchFamily="2" charset="2"/>
+              <a:buChar char="§"/>
+            </a:pPr>
+            <a:r>
+              <a:rPr lang="en-US" sz="2800" dirty="0" err="1">
+                <a:solidFill>
+                  <a:schemeClr val="bg1"/>
+                </a:solidFill>
+                <a:latin typeface="Segoe UI Light" panose="020B0502040204020203" pitchFamily="34" charset="0"/>
+                <a:cs typeface="Segoe UI Light" panose="020B0502040204020203" pitchFamily="34" charset="0"/>
+              </a:rPr>
+              <a:t>IoT</a:t>
+            </a:r>
+            <a:r>
+              <a:rPr lang="en-US" sz="2800" dirty="0">
+                <a:solidFill>
+                  <a:schemeClr val="bg1"/>
+                </a:solidFill>
+                <a:latin typeface="Segoe UI Light" panose="020B0502040204020203" pitchFamily="34" charset="0"/>
+                <a:cs typeface="Segoe UI Light" panose="020B0502040204020203" pitchFamily="34" charset="0"/>
+              </a:rPr>
+              <a:t> projects with geolocation distributed </a:t>
+            </a:r>
+            <a:r>
+              <a:rPr lang="en-US" sz="2800" dirty="0" err="1">
+                <a:solidFill>
+                  <a:schemeClr val="bg1"/>
+                </a:solidFill>
+                <a:latin typeface="Segoe UI Light" panose="020B0502040204020203" pitchFamily="34" charset="0"/>
+                <a:cs typeface="Segoe UI Light" panose="020B0502040204020203" pitchFamily="34" charset="0"/>
+              </a:rPr>
+              <a:t>EndPoints</a:t>
+            </a:r>
+            <a:r>
+              <a:rPr lang="en-US" sz="2800" dirty="0">
+                <a:solidFill>
+                  <a:schemeClr val="bg1"/>
+                </a:solidFill>
+                <a:latin typeface="Segoe UI Light" panose="020B0502040204020203" pitchFamily="34" charset="0"/>
+                <a:cs typeface="Segoe UI Light" panose="020B0502040204020203" pitchFamily="34" charset="0"/>
+              </a:rPr>
+              <a:t>.</a:t>
+            </a:r>
+          </a:p>
+          <a:p>
+            <a:pPr marL="457200" indent="-457200" algn="l">
+              <a:lnSpc>
+                <a:spcPct val="150000"/>
+              </a:lnSpc>
+              <a:buFont typeface="Wingdings" panose="05000000000000000000" pitchFamily="2" charset="2"/>
+              <a:buChar char="§"/>
+            </a:pPr>
+            <a:r>
+              <a:rPr lang="en-US" sz="2800" dirty="0">
+                <a:solidFill>
+                  <a:schemeClr val="bg1"/>
+                </a:solidFill>
+                <a:latin typeface="Segoe UI Light" panose="020B0502040204020203" pitchFamily="34" charset="0"/>
+                <a:cs typeface="Segoe UI Light" panose="020B0502040204020203" pitchFamily="34" charset="0"/>
+              </a:rPr>
+              <a:t>Organizations with Microsoft infrastructure and Echo System.</a:t>
+            </a:r>
+          </a:p>
+          <a:p>
+            <a:pPr algn="l">
+              <a:lnSpc>
+                <a:spcPct val="150000"/>
+              </a:lnSpc>
+            </a:pPr>
+            <a:endParaRPr lang="en-US" sz="2800" dirty="0">
+              <a:solidFill>
+                <a:schemeClr val="bg1"/>
+              </a:solidFill>
+              <a:latin typeface="Segoe UI Light" panose="020B0502040204020203" pitchFamily="34" charset="0"/>
+              <a:cs typeface="Segoe UI Light" panose="020B0502040204020203" pitchFamily="34" charset="0"/>
+            </a:endParaRPr>
+          </a:p>
+          <a:p>
+            <a:pPr marL="457200" indent="-457200" algn="l">
+              <a:lnSpc>
+                <a:spcPct val="150000"/>
+              </a:lnSpc>
+              <a:buFont typeface="Wingdings" panose="05000000000000000000" pitchFamily="2" charset="2"/>
+              <a:buChar char="§"/>
+            </a:pPr>
+            <a:endParaRPr lang="en-US" sz="2800" dirty="0">
+              <a:solidFill>
+                <a:schemeClr val="bg1"/>
+              </a:solidFill>
+              <a:latin typeface="Segoe UI Light" panose="020B0502040204020203" pitchFamily="34" charset="0"/>
+              <a:cs typeface="Segoe UI Light" panose="020B0502040204020203" pitchFamily="34" charset="0"/>
+            </a:endParaRPr>
+          </a:p>
+          <a:p>
+            <a:pPr marL="457200" indent="-457200" algn="l">
+              <a:lnSpc>
+                <a:spcPct val="150000"/>
+              </a:lnSpc>
+              <a:buFont typeface="Wingdings" panose="05000000000000000000" pitchFamily="2" charset="2"/>
+              <a:buChar char="§"/>
+            </a:pPr>
+            <a:endParaRPr lang="en-US" sz="2800" dirty="0">
+              <a:solidFill>
+                <a:schemeClr val="bg1"/>
+              </a:solidFill>
+              <a:latin typeface="Segoe UI Light" panose="020B0502040204020203" pitchFamily="34" charset="0"/>
+              <a:cs typeface="Segoe UI Light" panose="020B0502040204020203" pitchFamily="34" charset="0"/>
+            </a:endParaRPr>
+          </a:p>
+        </p:txBody>
+      </p:sp>
+      <p:sp>
+        <p:nvSpPr>
+          <p:cNvPr id="5" name="Rectangle 4"/>
+          <p:cNvSpPr/>
+          <p:nvPr/>
+        </p:nvSpPr>
+        <p:spPr>
+          <a:xfrm>
+            <a:off x="0" y="6570725"/>
+            <a:ext cx="12192000" cy="287276"/>
+          </a:xfrm>
+          <a:prstGeom prst="rect">
+            <a:avLst/>
+          </a:prstGeom>
+          <a:solidFill>
+            <a:srgbClr val="002050"/>
+          </a:solidFill>
+          <a:ln>
+            <a:noFill/>
+          </a:ln>
+        </p:spPr>
+        <p:style>
+          <a:lnRef idx="2">
+            <a:schemeClr val="accent1">
+              <a:shade val="50000"/>
+            </a:schemeClr>
+          </a:lnRef>
+          <a:fillRef idx="1">
+            <a:schemeClr val="accent1"/>
+          </a:fillRef>
+          <a:effectRef idx="0">
+            <a:schemeClr val="accent1"/>
+          </a:effectRef>
+          <a:fontRef idx="minor">
+            <a:schemeClr val="lt1"/>
+          </a:fontRef>
+        </p:style>
+        <p:txBody>
+          <a:bodyPr rtlCol="0" anchor="ctr"/>
+          <a:lstStyle/>
+          <a:p>
+            <a:pPr algn="ctr"/>
+            <a:endParaRPr lang="en-US" dirty="0"/>
+          </a:p>
+        </p:txBody>
+      </p:sp>
+    </p:spTree>
+    <p:extLst>
+      <p:ext uri="{BB962C8B-B14F-4D97-AF65-F5344CB8AC3E}">
+        <p14:creationId xmlns:p14="http://schemas.microsoft.com/office/powerpoint/2010/main" val="1906880574"/>
+      </p:ext>
+    </p:extLst>
+  </p:cSld>
+  <p:clrMapOvr>
+    <a:masterClrMapping/>
+  </p:clrMapOvr>
+  <p:transition spd="slow">
+    <p:push dir="u"/>
+  </p:transition>
+  <p:timing>
+    <p:tnLst>
+      <p:par>
+        <p:cTn id="1" dur="indefinite" restart="never" nodeType="tmRoot">
+          <p:childTnLst>
+            <p:seq concurrent="1" nextAc="seek">
+              <p:cTn id="2" dur="indefinite" nodeType="mainSeq">
+                <p:childTnLst>
+                  <p:par>
+                    <p:cTn id="3" fill="hold">
+                      <p:stCondLst>
+                        <p:cond delay="indefinite"/>
+                        <p:cond evt="onBegin" delay="0">
+                          <p:tn val="2"/>
+                        </p:cond>
+                      </p:stCondLst>
+                      <p:childTnLst>
+                        <p:par>
+                          <p:cTn id="4" fill="hold">
+                            <p:stCondLst>
+                              <p:cond delay="0"/>
+                            </p:stCondLst>
+                            <p:childTnLst>
+                              <p:par>
+                                <p:cTn id="5" presetID="10" presetClass="entr" presetSubtype="0" fill="hold" grpId="0" nodeType="afterEffect">
+                                  <p:stCondLst>
+                                    <p:cond delay="0"/>
+                                  </p:stCondLst>
+                                  <p:childTnLst>
+                                    <p:set>
+                                      <p:cBhvr>
+                                        <p:cTn id="6" dur="1" fill="hold">
+                                          <p:stCondLst>
+                                            <p:cond delay="0"/>
+                                          </p:stCondLst>
+                                        </p:cTn>
+                                        <p:tgtEl>
+                                          <p:spTgt spid="69"/>
+                                        </p:tgtEl>
+                                        <p:attrNameLst>
+                                          <p:attrName>style.visibility</p:attrName>
+                                        </p:attrNameLst>
+                                      </p:cBhvr>
+                                      <p:to>
+                                        <p:strVal val="visible"/>
+                                      </p:to>
+                                    </p:set>
+                                    <p:animEffect transition="in" filter="fade">
+                                      <p:cBhvr>
+                                        <p:cTn id="7" dur="500"/>
+                                        <p:tgtEl>
+                                          <p:spTgt spid="69"/>
+                                        </p:tgtEl>
+                                      </p:cBhvr>
+                                    </p:animEffect>
+                                  </p:childTnLst>
+                                </p:cTn>
+                              </p:par>
+                            </p:childTnLst>
+                          </p:cTn>
+                        </p:par>
+                      </p:childTnLst>
+                    </p:cTn>
+                  </p:par>
+                </p:childTnLst>
+              </p:cTn>
+              <p:prevCondLst>
+                <p:cond evt="onPrev" delay="0">
+                  <p:tgtEl>
+                    <p:sldTgt/>
+                  </p:tgtEl>
+                </p:cond>
+              </p:prevCondLst>
+              <p:nextCondLst>
+                <p:cond evt="onNext" delay="0">
+                  <p:tgtEl>
+                    <p:sldTgt/>
+                  </p:tgtEl>
+                </p:cond>
+              </p:nextCondLst>
+            </p:seq>
+          </p:childTnLst>
+        </p:cTn>
+      </p:par>
+    </p:tnLst>
+    <p:bldLst>
+      <p:bldP spid="69" grpId="0"/>
+    </p:bldLst>
+  </p:timing>
+</p:sld>
+</file>
+
+<file path=ppt/slides/slide5.xml><?xml version="1.0" encoding="utf-8"?>
+<p:sld xmlns:a="http://schemas.openxmlformats.org/drawingml/2006/main" xmlns:r="http://schemas.openxmlformats.org/officeDocument/2006/relationships" xmlns:p="http://schemas.openxmlformats.org/presentationml/2006/main">
+  <p:cSld>
+    <p:bg>
+      <p:bgPr>
+        <a:solidFill>
+          <a:srgbClr val="0078D7"/>
+        </a:solidFill>
+        <a:effectLst/>
+      </p:bgPr>
+    </p:bg>
+    <p:spTree>
+      <p:nvGrpSpPr>
+        <p:cNvPr id="1" name=""/>
+        <p:cNvGrpSpPr/>
+        <p:nvPr/>
+      </p:nvGrpSpPr>
+      <p:grpSpPr>
+        <a:xfrm>
+          <a:off x="0" y="0"/>
+          <a:ext cx="0" cy="0"/>
+          <a:chOff x="0" y="0"/>
+          <a:chExt cx="0" cy="0"/>
+        </a:xfrm>
+      </p:grpSpPr>
+      <p:sp>
+        <p:nvSpPr>
+          <p:cNvPr id="64" name="Rectangle 63"/>
+          <p:cNvSpPr/>
+          <p:nvPr/>
+        </p:nvSpPr>
+        <p:spPr>
+          <a:xfrm>
+            <a:off x="0" y="1972"/>
+            <a:ext cx="12192000" cy="1007235"/>
+          </a:xfrm>
+          <a:prstGeom prst="rect">
+            <a:avLst/>
+          </a:prstGeom>
+          <a:solidFill>
+            <a:srgbClr val="002050"/>
+          </a:solidFill>
+          <a:ln>
+            <a:noFill/>
+          </a:ln>
+        </p:spPr>
+        <p:style>
+          <a:lnRef idx="2">
+            <a:schemeClr val="accent1">
+              <a:shade val="50000"/>
+            </a:schemeClr>
+          </a:lnRef>
+          <a:fillRef idx="1">
+            <a:schemeClr val="accent1"/>
+          </a:fillRef>
+          <a:effectRef idx="0">
+            <a:schemeClr val="accent1"/>
+          </a:effectRef>
+          <a:fontRef idx="minor">
+            <a:schemeClr val="lt1"/>
+          </a:fontRef>
+        </p:style>
+        <p:txBody>
+          <a:bodyPr rtlCol="0" anchor="ctr"/>
+          <a:lstStyle/>
+          <a:p>
+            <a:pPr algn="ctr"/>
+            <a:endParaRPr lang="en-US" dirty="0"/>
+          </a:p>
+        </p:txBody>
+      </p:sp>
+      <p:sp>
+        <p:nvSpPr>
+          <p:cNvPr id="65" name="Rectangle 64"/>
+          <p:cNvSpPr/>
+          <p:nvPr/>
+        </p:nvSpPr>
+        <p:spPr>
+          <a:xfrm>
+            <a:off x="181095" y="60755"/>
+            <a:ext cx="5897705" cy="820096"/>
+          </a:xfrm>
+          <a:prstGeom prst="rect">
+            <a:avLst/>
+          </a:prstGeom>
+        </p:spPr>
+        <p:txBody>
+          <a:bodyPr wrap="none">
+            <a:spAutoFit/>
+          </a:bodyPr>
+          <a:lstStyle/>
+          <a:p>
+            <a:pPr>
+              <a:lnSpc>
+                <a:spcPct val="150000"/>
+              </a:lnSpc>
+            </a:pPr>
+            <a:r>
+              <a:rPr lang="en-US" sz="3600" dirty="0">
+                <a:solidFill>
+                  <a:schemeClr val="bg1"/>
+                </a:solidFill>
+                <a:latin typeface="Segoe UI Light" panose="020B0502040204020203" pitchFamily="34" charset="0"/>
+                <a:cs typeface="Segoe UI Light" panose="020B0502040204020203" pitchFamily="34" charset="0"/>
+              </a:rPr>
+              <a:t>Why Microsoft Technologies ?</a:t>
+            </a:r>
+          </a:p>
+        </p:txBody>
+      </p:sp>
+      <p:sp>
+        <p:nvSpPr>
+          <p:cNvPr id="69" name="Title 1"/>
+          <p:cNvSpPr txBox="1">
+            <a:spLocks/>
+          </p:cNvSpPr>
+          <p:nvPr/>
+        </p:nvSpPr>
+        <p:spPr>
+          <a:xfrm>
+            <a:off x="911677" y="1470787"/>
+            <a:ext cx="10956861" cy="4052935"/>
+          </a:xfrm>
+          <a:prstGeom prst="rect">
+            <a:avLst/>
+          </a:prstGeom>
+        </p:spPr>
+        <p:txBody>
+          <a:bodyPr vert="horz" lIns="91440" tIns="45720" rIns="91440" bIns="45720" rtlCol="0" anchor="t">
+            <a:noAutofit/>
+          </a:bodyPr>
+          <a:lstStyle>
+            <a:lvl1pPr algn="ctr" defTabSz="914400" rtl="0" eaLnBrk="1" latinLnBrk="0" hangingPunct="1">
+              <a:lnSpc>
+                <a:spcPct val="90000"/>
+              </a:lnSpc>
+              <a:spcBef>
+                <a:spcPct val="0"/>
+              </a:spcBef>
+              <a:buNone/>
+              <a:defRPr sz="6000" kern="1200">
+                <a:solidFill>
+                  <a:schemeClr val="tx1"/>
+                </a:solidFill>
+                <a:latin typeface="+mj-lt"/>
+                <a:ea typeface="+mj-ea"/>
+                <a:cs typeface="+mj-cs"/>
+              </a:defRPr>
+            </a:lvl1pPr>
+          </a:lstStyle>
+          <a:p>
+            <a:pPr marL="457200" indent="-457200" algn="l">
+              <a:lnSpc>
+                <a:spcPct val="150000"/>
+              </a:lnSpc>
+              <a:buFont typeface="Wingdings" panose="05000000000000000000" pitchFamily="2" charset="2"/>
+              <a:buChar char="§"/>
+            </a:pPr>
+            <a:r>
+              <a:rPr lang="en-US" sz="2800" dirty="0">
+                <a:solidFill>
+                  <a:schemeClr val="bg1"/>
+                </a:solidFill>
+                <a:latin typeface="Segoe UI Light" panose="020B0502040204020203" pitchFamily="34" charset="0"/>
+                <a:cs typeface="Segoe UI Light" panose="020B0502040204020203" pitchFamily="34" charset="0"/>
+              </a:rPr>
+              <a:t>Majority of Organizations have Microsoft Infrastructure.</a:t>
+            </a:r>
+          </a:p>
+          <a:p>
+            <a:pPr marL="457200" indent="-457200" algn="l">
+              <a:lnSpc>
+                <a:spcPct val="150000"/>
+              </a:lnSpc>
+              <a:buFont typeface="Wingdings" panose="05000000000000000000" pitchFamily="2" charset="2"/>
+              <a:buChar char="§"/>
+            </a:pPr>
+            <a:r>
+              <a:rPr lang="en-US" sz="2800" dirty="0">
+                <a:solidFill>
+                  <a:schemeClr val="bg1"/>
+                </a:solidFill>
+                <a:latin typeface="Segoe UI Light" panose="020B0502040204020203" pitchFamily="34" charset="0"/>
+                <a:cs typeface="Segoe UI Light" panose="020B0502040204020203" pitchFamily="34" charset="0"/>
+              </a:rPr>
+              <a:t>Microsoft is moving to Open Source.</a:t>
+            </a:r>
+          </a:p>
+          <a:p>
+            <a:pPr marL="457200" indent="-457200" algn="l">
+              <a:lnSpc>
+                <a:spcPct val="150000"/>
+              </a:lnSpc>
+              <a:buFont typeface="Wingdings" panose="05000000000000000000" pitchFamily="2" charset="2"/>
+              <a:buChar char="§"/>
+            </a:pPr>
+            <a:r>
+              <a:rPr lang="en-US" sz="2800" dirty="0">
+                <a:solidFill>
+                  <a:schemeClr val="bg1"/>
+                </a:solidFill>
+                <a:latin typeface="Segoe UI Light" panose="020B0502040204020203" pitchFamily="34" charset="0"/>
+                <a:cs typeface="Segoe UI Light" panose="020B0502040204020203" pitchFamily="34" charset="0"/>
+              </a:rPr>
+              <a:t>Microsoft have the biggest echo-system.</a:t>
+            </a:r>
+          </a:p>
+          <a:p>
+            <a:pPr marL="457200" indent="-457200" algn="l">
+              <a:lnSpc>
+                <a:spcPct val="150000"/>
+              </a:lnSpc>
+              <a:buFont typeface="Wingdings" panose="05000000000000000000" pitchFamily="2" charset="2"/>
+              <a:buChar char="§"/>
+            </a:pPr>
+            <a:r>
+              <a:rPr lang="en-US" sz="2800" dirty="0">
+                <a:solidFill>
+                  <a:schemeClr val="bg1"/>
+                </a:solidFill>
+                <a:latin typeface="Segoe UI Light" panose="020B0502040204020203" pitchFamily="34" charset="0"/>
+                <a:cs typeface="Segoe UI Light" panose="020B0502040204020203" pitchFamily="34" charset="0"/>
+              </a:rPr>
+              <a:t>C# + </a:t>
+            </a:r>
+            <a:r>
+              <a:rPr lang="en-US" sz="2800" dirty="0" err="1">
+                <a:solidFill>
+                  <a:schemeClr val="bg1"/>
+                </a:solidFill>
+                <a:latin typeface="Segoe UI Light" panose="020B0502040204020203" pitchFamily="34" charset="0"/>
+                <a:cs typeface="Segoe UI Light" panose="020B0502040204020203" pitchFamily="34" charset="0"/>
+              </a:rPr>
+              <a:t>.Net</a:t>
+            </a:r>
+            <a:r>
+              <a:rPr lang="en-US" sz="2800" dirty="0">
+                <a:solidFill>
+                  <a:schemeClr val="bg1"/>
+                </a:solidFill>
+                <a:latin typeface="Segoe UI Light" panose="020B0502040204020203" pitchFamily="34" charset="0"/>
+                <a:cs typeface="Segoe UI Light" panose="020B0502040204020203" pitchFamily="34" charset="0"/>
+              </a:rPr>
+              <a:t> = Support cross-platform.</a:t>
+            </a:r>
+          </a:p>
+          <a:p>
+            <a:pPr marL="457200" indent="-457200" algn="l">
+              <a:lnSpc>
+                <a:spcPct val="150000"/>
+              </a:lnSpc>
+              <a:buFont typeface="Wingdings" panose="05000000000000000000" pitchFamily="2" charset="2"/>
+              <a:buChar char="§"/>
+            </a:pPr>
+            <a:endParaRPr lang="en-US" sz="2800" dirty="0">
+              <a:solidFill>
+                <a:schemeClr val="bg1"/>
+              </a:solidFill>
+              <a:latin typeface="Segoe UI Light" panose="020B0502040204020203" pitchFamily="34" charset="0"/>
+              <a:cs typeface="Segoe UI Light" panose="020B0502040204020203" pitchFamily="34" charset="0"/>
+            </a:endParaRPr>
+          </a:p>
+          <a:p>
+            <a:pPr marL="457200" indent="-457200" algn="l">
+              <a:lnSpc>
+                <a:spcPct val="150000"/>
+              </a:lnSpc>
+              <a:buFont typeface="Wingdings" panose="05000000000000000000" pitchFamily="2" charset="2"/>
+              <a:buChar char="§"/>
+            </a:pPr>
+            <a:endParaRPr lang="en-US" sz="2800" dirty="0">
+              <a:solidFill>
+                <a:schemeClr val="bg1"/>
+              </a:solidFill>
+              <a:latin typeface="Segoe UI Light" panose="020B0502040204020203" pitchFamily="34" charset="0"/>
+              <a:cs typeface="Segoe UI Light" panose="020B0502040204020203" pitchFamily="34" charset="0"/>
+            </a:endParaRPr>
+          </a:p>
+        </p:txBody>
+      </p:sp>
+      <p:sp>
+        <p:nvSpPr>
+          <p:cNvPr id="5" name="Rectangle 4"/>
+          <p:cNvSpPr/>
+          <p:nvPr/>
+        </p:nvSpPr>
+        <p:spPr>
+          <a:xfrm>
+            <a:off x="0" y="6570725"/>
+            <a:ext cx="12192000" cy="287276"/>
+          </a:xfrm>
+          <a:prstGeom prst="rect">
+            <a:avLst/>
+          </a:prstGeom>
+          <a:solidFill>
+            <a:srgbClr val="002050"/>
+          </a:solidFill>
+          <a:ln>
+            <a:noFill/>
+          </a:ln>
+        </p:spPr>
+        <p:style>
+          <a:lnRef idx="2">
+            <a:schemeClr val="accent1">
+              <a:shade val="50000"/>
+            </a:schemeClr>
+          </a:lnRef>
+          <a:fillRef idx="1">
+            <a:schemeClr val="accent1"/>
+          </a:fillRef>
+          <a:effectRef idx="0">
+            <a:schemeClr val="accent1"/>
+          </a:effectRef>
+          <a:fontRef idx="minor">
+            <a:schemeClr val="lt1"/>
+          </a:fontRef>
+        </p:style>
+        <p:txBody>
+          <a:bodyPr rtlCol="0" anchor="ctr"/>
+          <a:lstStyle/>
+          <a:p>
+            <a:pPr algn="ctr"/>
+            <a:endParaRPr lang="en-US" dirty="0"/>
+          </a:p>
+        </p:txBody>
+      </p:sp>
+    </p:spTree>
+    <p:extLst>
+      <p:ext uri="{BB962C8B-B14F-4D97-AF65-F5344CB8AC3E}">
+        <p14:creationId xmlns:p14="http://schemas.microsoft.com/office/powerpoint/2010/main" val="3206585507"/>
+      </p:ext>
+    </p:extLst>
+  </p:cSld>
+  <p:clrMapOvr>
+    <a:masterClrMapping/>
+  </p:clrMapOvr>
+  <p:transition spd="slow">
+    <p:push dir="u"/>
+  </p:transition>
+  <p:timing>
+    <p:tnLst>
+      <p:par>
+        <p:cTn id="1" dur="indefinite" restart="never" nodeType="tmRoot">
+          <p:childTnLst>
+            <p:seq concurrent="1" nextAc="seek">
+              <p:cTn id="2" dur="indefinite" nodeType="mainSeq">
+                <p:childTnLst>
+                  <p:par>
+                    <p:cTn id="3" fill="hold">
+                      <p:stCondLst>
+                        <p:cond delay="indefinite"/>
+                        <p:cond evt="onBegin" delay="0">
+                          <p:tn val="2"/>
+                        </p:cond>
+                      </p:stCondLst>
+                      <p:childTnLst>
+                        <p:par>
+                          <p:cTn id="4" fill="hold">
+                            <p:stCondLst>
+                              <p:cond delay="0"/>
+                            </p:stCondLst>
+                            <p:childTnLst>
+                              <p:par>
+                                <p:cTn id="5" presetID="10" presetClass="entr" presetSubtype="0" fill="hold" grpId="0" nodeType="afterEffect">
+                                  <p:stCondLst>
+                                    <p:cond delay="0"/>
+                                  </p:stCondLst>
+                                  <p:childTnLst>
+                                    <p:set>
+                                      <p:cBhvr>
+                                        <p:cTn id="6" dur="1" fill="hold">
+                                          <p:stCondLst>
+                                            <p:cond delay="0"/>
+                                          </p:stCondLst>
+                                        </p:cTn>
+                                        <p:tgtEl>
+                                          <p:spTgt spid="69"/>
+                                        </p:tgtEl>
+                                        <p:attrNameLst>
+                                          <p:attrName>style.visibility</p:attrName>
+                                        </p:attrNameLst>
+                                      </p:cBhvr>
+                                      <p:to>
+                                        <p:strVal val="visible"/>
+                                      </p:to>
+                                    </p:set>
+                                    <p:animEffect transition="in" filter="fade">
+                                      <p:cBhvr>
+                                        <p:cTn id="7" dur="500"/>
+                                        <p:tgtEl>
+                                          <p:spTgt spid="69"/>
+                                        </p:tgtEl>
+                                      </p:cBhvr>
+                                    </p:animEffect>
+                                  </p:childTnLst>
+                                </p:cTn>
+                              </p:par>
+                            </p:childTnLst>
+                          </p:cTn>
+                        </p:par>
+                      </p:childTnLst>
+                    </p:cTn>
+                  </p:par>
+                </p:childTnLst>
+              </p:cTn>
+              <p:prevCondLst>
+                <p:cond evt="onPrev" delay="0">
+                  <p:tgtEl>
+                    <p:sldTgt/>
+                  </p:tgtEl>
+                </p:cond>
+              </p:prevCondLst>
+              <p:nextCondLst>
+                <p:cond evt="onNext" delay="0">
+                  <p:tgtEl>
+                    <p:sldTgt/>
+                  </p:tgtEl>
+                </p:cond>
+              </p:nextCondLst>
+            </p:seq>
+          </p:childTnLst>
+        </p:cTn>
+      </p:par>
+    </p:tnLst>
+    <p:bldLst>
+      <p:bldP spid="69" grpId="0"/>
+    </p:bldLst>
+  </p:timing>
+</p:sld>
+</file>
+
+<file path=ppt/slides/slide6.xml><?xml version="1.0" encoding="utf-8"?>
+<p:sld xmlns:a="http://schemas.openxmlformats.org/drawingml/2006/main" xmlns:r="http://schemas.openxmlformats.org/officeDocument/2006/relationships" xmlns:p="http://schemas.openxmlformats.org/presentationml/2006/main">
+  <p:cSld>
+    <p:bg>
+      <p:bgPr>
+        <a:solidFill>
+          <a:srgbClr val="002050"/>
+        </a:solidFill>
+        <a:effectLst/>
+      </p:bgPr>
+    </p:bg>
+    <p:spTree>
+      <p:nvGrpSpPr>
+        <p:cNvPr id="1" name=""/>
+        <p:cNvGrpSpPr/>
+        <p:nvPr/>
+      </p:nvGrpSpPr>
+      <p:grpSpPr>
+        <a:xfrm>
+          <a:off x="0" y="0"/>
+          <a:ext cx="0" cy="0"/>
+          <a:chOff x="0" y="0"/>
+          <a:chExt cx="0" cy="0"/>
+        </a:xfrm>
+      </p:grpSpPr>
+      <p:sp>
+        <p:nvSpPr>
+          <p:cNvPr id="5" name="Rectangle 4"/>
+          <p:cNvSpPr/>
+          <p:nvPr/>
+        </p:nvSpPr>
+        <p:spPr>
+          <a:xfrm>
+            <a:off x="0" y="6570725"/>
+            <a:ext cx="12192000" cy="287276"/>
+          </a:xfrm>
+          <a:prstGeom prst="rect">
+            <a:avLst/>
+          </a:prstGeom>
+          <a:solidFill>
+            <a:srgbClr val="002050"/>
+          </a:solidFill>
+          <a:ln>
+            <a:noFill/>
+          </a:ln>
+        </p:spPr>
+        <p:style>
+          <a:lnRef idx="2">
+            <a:schemeClr val="accent1">
+              <a:shade val="50000"/>
+            </a:schemeClr>
+          </a:lnRef>
+          <a:fillRef idx="1">
+            <a:schemeClr val="accent1"/>
+          </a:fillRef>
+          <a:effectRef idx="0">
+            <a:schemeClr val="accent1"/>
+          </a:effectRef>
+          <a:fontRef idx="minor">
+            <a:schemeClr val="lt1"/>
+          </a:fontRef>
+        </p:style>
+        <p:txBody>
+          <a:bodyPr rtlCol="0" anchor="ctr"/>
+          <a:lstStyle/>
+          <a:p>
+            <a:pPr algn="ctr"/>
+            <a:endParaRPr lang="en-US" dirty="0"/>
+          </a:p>
+        </p:txBody>
+      </p:sp>
+      <p:pic>
+        <p:nvPicPr>
+          <p:cNvPr id="6" name="Picture 2" descr="github open source code"/>
+          <p:cNvPicPr>
+            <a:picLocks noChangeAspect="1" noChangeArrowheads="1"/>
+          </p:cNvPicPr>
+          <p:nvPr/>
+        </p:nvPicPr>
+        <p:blipFill>
+          <a:blip r:embed="rId2">
+            <a:extLst>
+              <a:ext uri="{28A0092B-C50C-407E-A947-70E740481C1C}">
+                <a14:useLocalDpi xmlns:a14="http://schemas.microsoft.com/office/drawing/2010/main" val="0"/>
+              </a:ext>
+            </a:extLst>
+          </a:blip>
+          <a:srcRect/>
+          <a:stretch>
+            <a:fillRect/>
+          </a:stretch>
+        </p:blipFill>
+        <p:spPr bwMode="auto">
+          <a:xfrm>
+            <a:off x="160238" y="177283"/>
+            <a:ext cx="4719673" cy="6462436"/>
+          </a:xfrm>
+          <a:prstGeom prst="rect">
+            <a:avLst/>
+          </a:prstGeom>
+          <a:noFill/>
+          <a:extLst>
+            <a:ext uri="{909E8E84-426E-40DD-AFC4-6F175D3DCCD1}">
+              <a14:hiddenFill xmlns:a14="http://schemas.microsoft.com/office/drawing/2010/main">
+                <a:solidFill>
+                  <a:srgbClr val="FFFFFF"/>
+                </a:solidFill>
+              </a14:hiddenFill>
+            </a:ext>
+          </a:extLst>
+        </p:spPr>
+      </p:pic>
+    </p:spTree>
+    <p:extLst>
+      <p:ext uri="{BB962C8B-B14F-4D97-AF65-F5344CB8AC3E}">
+        <p14:creationId xmlns:p14="http://schemas.microsoft.com/office/powerpoint/2010/main" val="1909439029"/>
+      </p:ext>
+    </p:extLst>
+  </p:cSld>
+  <p:clrMapOvr>
+    <a:masterClrMapping/>
+  </p:clrMapOvr>
+  <p:transition spd="slow">
+    <p:push dir="u"/>
+  </p:transition>
+</p:sld>
+</file>
+
+<file path=ppt/slides/slide7.xml><?xml version="1.0" encoding="utf-8"?>
 <p:sld xmlns:a="http://schemas.openxmlformats.org/drawingml/2006/main" xmlns:r="http://schemas.openxmlformats.org/officeDocument/2006/relationships" xmlns:p="http://schemas.openxmlformats.org/presentationml/2006/main">
   <p:cSld>
     <p:spTree>
@@ -6482,7 +8018,7 @@
 </p:sld>
 </file>
 
-<file path=ppt/slides/slide4.xml><?xml version="1.0" encoding="utf-8"?>
+<file path=ppt/slides/slide8.xml><?xml version="1.0" encoding="utf-8"?>
 <p:sld xmlns:a="http://schemas.openxmlformats.org/drawingml/2006/main" xmlns:r="http://schemas.openxmlformats.org/officeDocument/2006/relationships" xmlns:p="http://schemas.openxmlformats.org/presentationml/2006/main">
   <p:cSld>
     <p:spTree>
@@ -7654,7 +9190,7 @@
 </p:sld>
 </file>
 
-<file path=ppt/slides/slide5.xml><?xml version="1.0" encoding="utf-8"?>
+<file path=ppt/slides/slide9.xml><?xml version="1.0" encoding="utf-8"?>
 <p:sld xmlns:a="http://schemas.openxmlformats.org/drawingml/2006/main" xmlns:r="http://schemas.openxmlformats.org/officeDocument/2006/relationships" xmlns:p="http://schemas.openxmlformats.org/presentationml/2006/main">
   <p:cSld>
     <p:spTree>

</xml_diff>